<commit_message>
Add Slide 7 and 8
</commit_message>
<xml_diff>
--- a/Officer.pptx
+++ b/Officer.pptx
@@ -3697,7 +3697,7 @@
           <a:p>
             <a:r>
               <a:rPr/>
-              <a:t>2018-11-12</a:t>
+              <a:t>2018-11-13</a:t>
             </a:r>
           </a:p>
         </p:txBody>
@@ -3767,8 +3767,8 @@
         </p:nvSpPr>
         <p:spPr>
           <a:xfrm>
-            <a:off x="1451579" y="804519"/>
-            <a:ext cx="9603275" cy="1049235"/>
+            <a:off x="1449217" y="804889"/>
+            <a:ext cx="9605635" cy="1059305"/>
           </a:xfrm>
         </p:spPr>
         <p:txBody>
@@ -3777,7 +3777,7 @@
           <a:p>
             <a:r>
               <a:rPr/>
-              <a:t>Investing in Stocks</a:t>
+              <a:t>Investing in Stock</a:t>
             </a:r>
           </a:p>
         </p:txBody>
@@ -3788,12 +3788,14 @@
           <p:cNvSpPr>
             <a:spLocks noGrp="1"/>
           </p:cNvSpPr>
-          <p:nvPr/>
-        </p:nvSpPr>
-        <p:spPr>
-          <a:xfrm>
-            <a:off x="1453896" y="1847088"/>
-            <a:ext cx="9607522" cy="0"/>
+          <p:nvPr>
+            <p:ph sz="half" idx="2"/>
+          </p:nvPr>
+        </p:nvSpPr>
+        <p:spPr>
+          <a:xfrm>
+            <a:off x="6413771" y="2017343"/>
+            <a:ext cx="4645152" cy="3441520"/>
           </a:xfrm>
         </p:spPr>
         <p:txBody>
@@ -3843,13 +3845,13 @@
             <a:spLocks noGrp="1"/>
           </p:cNvSpPr>
           <p:nvPr>
-            <p:ph type="body" orient="vert" idx="1"/>
-          </p:nvPr>
-        </p:nvSpPr>
-        <p:spPr>
-          <a:xfrm>
-            <a:off x="1451579" y="2015732"/>
-            <a:ext cx="9603275" cy="3450613"/>
+            <p:ph sz="half" idx="2"/>
+          </p:nvPr>
+        </p:nvSpPr>
+        <p:spPr>
+          <a:xfrm>
+            <a:off x="6413771" y="2017343"/>
+            <a:ext cx="4645152" cy="3441520"/>
           </a:xfrm>
         </p:spPr>
         <p:txBody>
@@ -3960,7 +3962,7 @@
           <a:p>
             <a:r>
               <a:rPr/>
-              <a:t>As George sees it</a:t>
+              <a:t>What is a Bear Market?</a:t>
             </a:r>
           </a:p>
         </p:txBody>
@@ -4034,7 +4036,7 @@
           <a:p>
             <a:r>
               <a:rPr/>
-              <a:t>As George sees it</a:t>
+              <a:t>Stock Market Indexes: the Dow Jones Industrial Average</a:t>
             </a:r>
           </a:p>
         </p:txBody>
@@ -4096,45 +4098,93 @@
             <p:ph type="title"/>
           </p:nvPr>
         </p:nvSpPr>
-        <p:spPr>
-          <a:xfrm>
-            <a:off x="1451206" y="1129513"/>
-            <a:ext cx="5532328" cy="1830584"/>
-          </a:xfrm>
-        </p:spPr>
-        <p:txBody>
-          <a:bodyPr/>
-          <a:lstStyle/>
-          <a:p>
-            <a:r>
-              <a:rPr/>
-              <a:t>What is a Bear Market?</a:t>
-            </a:r>
-          </a:p>
-        </p:txBody>
-      </p:sp>
-      <p:pic xmlns:a="http://schemas.openxmlformats.org/drawingml/2006/main" xmlns:r="http://schemas.openxmlformats.org/officeDocument/2006/relationships" xmlns:p="http://schemas.openxmlformats.org/presentationml/2006/main">
-        <p:nvPicPr>
-          <p:cNvPr id="3" name="pic"/>
-          <p:cNvPicPr/>
-          <p:nvPr/>
-        </p:nvPicPr>
-        <p:blipFill>
-          <a:blip cstate="print" r:embed="rId2"/>
-          <a:stretch>
-            <a:fillRect/>
-          </a:stretch>
-        </p:blipFill>
-        <p:spPr>
-          <a:xfrm>
-            <a:off x="8124389" y="1122542"/>
-            <a:ext cx="2791171" cy="1828800"/>
-          </a:xfrm>
-          <a:prstGeom prst="rect">
-            <a:avLst/>
-          </a:prstGeom>
-        </p:spPr>
-      </p:pic>
+        <p:spPr/>
+        <p:txBody xmlns:a="http://schemas.openxmlformats.org/drawingml/2006/main" xmlns:r="http://schemas.openxmlformats.org/officeDocument/2006/relationships" xmlns:p="http://schemas.openxmlformats.org/presentationml/2006/main">
+          <a:bodyPr/>
+          <a:lstStyle/>
+          <a:p xmlns:a="http://schemas.openxmlformats.org/drawingml/2006/main" xmlns:r="http://schemas.openxmlformats.org/officeDocument/2006/relationships" xmlns:p="http://schemas.openxmlformats.org/presentationml/2006/main">
+            <a:pPr xmlns:a="http://schemas.openxmlformats.org/drawingml/2006/main" xmlns:r="http://schemas.openxmlformats.org/officeDocument/2006/relationships" xmlns:p="http://schemas.openxmlformats.org/presentationml/2006/main"/>
+            <a:r>
+              <a:rPr sz="4400" b="1">
+                <a:solidFill>
+                  <a:srgbClr val="000000">
+                    <a:alpha val="100000"/>
+                  </a:srgbClr>
+                </a:solidFill>
+                <a:latin typeface="Arial (Headings)"/>
+                <a:cs typeface="Arial (Headings)"/>
+              </a:rPr>
+              <a:t>the last Bear Market</a:t>
+            </a:r>
+          </a:p>
+        </p:txBody>
+      </p:sp>
+      <p:sp xmlns:a="http://schemas.openxmlformats.org/drawingml/2006/main" xmlns:r="http://schemas.openxmlformats.org/officeDocument/2006/relationships" xmlns:p="http://schemas.openxmlformats.org/presentationml/2006/main">
+        <p:nvSpPr>
+          <p:cNvPr id="3" name=""/>
+          <p:cNvSpPr>
+            <a:spLocks noGrp="1"/>
+          </p:cNvSpPr>
+          <p:nvPr>
+            <p:ph idx="1"/>
+          </p:nvPr>
+        </p:nvSpPr>
+        <p:spPr>
+          <a:xfrm>
+            <a:off x="1451579" y="2015732"/>
+            <a:ext cx="9603275" cy="3450613"/>
+          </a:xfrm>
+        </p:spPr>
+        <p:txBody>
+          <a:bodyPr/>
+          <a:lstStyle/>
+          <a:p>
+            <a:pPr/>
+            <a:r>
+              <a:rPr sz="3600" b="1">
+                <a:solidFill>
+                  <a:srgbClr val="000000">
+                    <a:alpha val="100000"/>
+                  </a:srgbClr>
+                </a:solidFill>
+                <a:latin typeface="Arial"/>
+                <a:cs typeface="Arial"/>
+              </a:rPr>
+              <a:t>Sept. 30, 2002 Dow 7528</a:t>
+            </a:r>
+          </a:p>
+          <a:p>
+            <a:pPr/>
+            <a:r>
+              <a:rPr sz="3600" b="1">
+                <a:solidFill>
+                  <a:srgbClr val="000000">
+                    <a:alpha val="100000"/>
+                  </a:srgbClr>
+                </a:solidFill>
+                <a:latin typeface="Arial"/>
+                <a:cs typeface="Arial"/>
+              </a:rPr>
+              <a:t>Jan. 5, 2004 Dow 10,568</a:t>
+            </a:r>
+          </a:p>
+          <a:p>
+            <a:pPr/>
+            <a:r>
+              <a:rPr sz="3600" b="1">
+                <a:solidFill>
+                  <a:srgbClr val="000000">
+                    <a:alpha val="100000"/>
+                  </a:srgbClr>
+                </a:solidFill>
+                <a:latin typeface="Arial"/>
+                <a:cs typeface="Arial"/>
+              </a:rPr>
+              <a:t>Oct. 8, 2007 Dow 14093</a:t>
+            </a:r>
+          </a:p>
+        </p:txBody>
+      </p:sp>
     </p:spTree>
   </p:cSld>
   <p:clrMapOvr>
@@ -4170,45 +4220,108 @@
             <p:ph type="title"/>
           </p:nvPr>
         </p:nvSpPr>
-        <p:spPr>
-          <a:xfrm>
-            <a:off x="1451206" y="1129513"/>
-            <a:ext cx="5532328" cy="1830584"/>
-          </a:xfrm>
-        </p:spPr>
-        <p:txBody>
-          <a:bodyPr/>
-          <a:lstStyle/>
-          <a:p>
-            <a:r>
-              <a:rPr/>
-              <a:t>Stock Market Indexes: the Dow Jones Industrial Average</a:t>
-            </a:r>
-          </a:p>
-        </p:txBody>
-      </p:sp>
-      <p:pic xmlns:a="http://schemas.openxmlformats.org/drawingml/2006/main" xmlns:r="http://schemas.openxmlformats.org/officeDocument/2006/relationships" xmlns:p="http://schemas.openxmlformats.org/presentationml/2006/main">
-        <p:nvPicPr>
-          <p:cNvPr id="3" name="pic"/>
-          <p:cNvPicPr/>
-          <p:nvPr/>
-        </p:nvPicPr>
-        <p:blipFill>
-          <a:blip cstate="print" r:embed="rId2"/>
-          <a:stretch>
-            <a:fillRect/>
-          </a:stretch>
-        </p:blipFill>
-        <p:spPr>
-          <a:xfrm>
-            <a:off x="8124389" y="1122542"/>
-            <a:ext cx="2791171" cy="1828800"/>
-          </a:xfrm>
-          <a:prstGeom prst="rect">
-            <a:avLst/>
-          </a:prstGeom>
-        </p:spPr>
-      </p:pic>
+        <p:spPr/>
+        <p:txBody xmlns:a="http://schemas.openxmlformats.org/drawingml/2006/main" xmlns:r="http://schemas.openxmlformats.org/officeDocument/2006/relationships" xmlns:p="http://schemas.openxmlformats.org/presentationml/2006/main">
+          <a:bodyPr/>
+          <a:lstStyle/>
+          <a:p xmlns:a="http://schemas.openxmlformats.org/drawingml/2006/main" xmlns:r="http://schemas.openxmlformats.org/officeDocument/2006/relationships" xmlns:p="http://schemas.openxmlformats.org/presentationml/2006/main">
+            <a:pPr xmlns:a="http://schemas.openxmlformats.org/drawingml/2006/main" xmlns:r="http://schemas.openxmlformats.org/officeDocument/2006/relationships" xmlns:p="http://schemas.openxmlformats.org/presentationml/2006/main"/>
+            <a:r>
+              <a:rPr sz="4400" b="1">
+                <a:solidFill>
+                  <a:srgbClr val="000000">
+                    <a:alpha val="100000"/>
+                  </a:srgbClr>
+                </a:solidFill>
+                <a:latin typeface="Arial (Headings)"/>
+                <a:cs typeface="Arial (Headings)"/>
+              </a:rPr>
+              <a:t>What I do in a Bear Market</a:t>
+            </a:r>
+          </a:p>
+        </p:txBody>
+      </p:sp>
+      <p:sp xmlns:a="http://schemas.openxmlformats.org/drawingml/2006/main" xmlns:r="http://schemas.openxmlformats.org/officeDocument/2006/relationships" xmlns:p="http://schemas.openxmlformats.org/presentationml/2006/main">
+        <p:nvSpPr>
+          <p:cNvPr id="3" name=""/>
+          <p:cNvSpPr>
+            <a:spLocks noGrp="1"/>
+          </p:cNvSpPr>
+          <p:nvPr>
+            <p:ph idx="1"/>
+          </p:nvPr>
+        </p:nvSpPr>
+        <p:spPr>
+          <a:xfrm>
+            <a:off x="1451579" y="2015732"/>
+            <a:ext cx="9603275" cy="3450613"/>
+          </a:xfrm>
+        </p:spPr>
+        <p:txBody>
+          <a:bodyPr/>
+          <a:lstStyle/>
+          <a:p>
+            <a:pPr/>
+            <a:r>
+              <a:rPr sz="2800" b="1">
+                <a:solidFill>
+                  <a:srgbClr val="000000">
+                    <a:alpha val="100000"/>
+                  </a:srgbClr>
+                </a:solidFill>
+                <a:latin typeface="Arial"/>
+                <a:cs typeface="Arial"/>
+              </a:rPr>
+              <a:t>Decide whether this is a market correction or the start of something more</a:t>
+            </a:r>
+          </a:p>
+          <a:p>
+            <a:pPr/>
+            <a:r>
+              <a:rPr sz="2800" b="1">
+                <a:solidFill>
+                  <a:srgbClr val="000000">
+                    <a:alpha val="100000"/>
+                  </a:srgbClr>
+                </a:solidFill>
+                <a:latin typeface="Arial"/>
+                <a:cs typeface="Arial"/>
+              </a:rPr>
+              <a:t>Review the stocks you own</a:t>
+            </a:r>
+          </a:p>
+          <a:p>
+            <a:pPr/>
+            <a:r>
+              <a:rPr sz="2800" b="1">
+                <a:solidFill>
+                  <a:srgbClr val="000000">
+                    <a:alpha val="100000"/>
+                  </a:srgbClr>
+                </a:solidFill>
+                <a:latin typeface="Arial"/>
+                <a:cs typeface="Arial"/>
+              </a:rPr>
+              <a:t>Review stocks you wanted to own but were too expensive at time of research</a:t>
+            </a:r>
+          </a:p>
+          <a:p>
+            <a:pPr/>
+            <a:r>
+              <a:rPr sz="2800" b="1">
+                <a:solidFill>
+                  <a:srgbClr val="000000">
+                    <a:alpha val="100000"/>
+                  </a:srgbClr>
+                </a:solidFill>
+                <a:latin typeface="Arial"/>
+                <a:cs typeface="Arial"/>
+              </a:rPr>
+              <a:t>Check your portfolio for balance or the type of stocks you own</a:t>
+            </a:r>
+          </a:p>
+        </p:txBody>
+      </p:sp>
     </p:spTree>
   </p:cSld>
   <p:clrMapOvr>

</xml_diff>